<commit_message>
Test teach feedback updates
Closes #122
</commit_message>
<xml_diff>
--- a/Content/Machine Learning/Machine Learning.pptx
+++ b/Content/Machine Learning/Machine Learning.pptx
@@ -2812,7 +2812,7 @@
           <a:p>
             <a:fld id="{2E5CA586-3557-4985-BCD4-35EF5AC8B4A4}" type="datetimeFigureOut">
               <a:rPr lang="en-US" smtClean="0"/>
-              <a:t>9/13/15</a:t>
+              <a:t>10/11/15</a:t>
             </a:fld>
             <a:endParaRPr lang="en-US"/>
           </a:p>
@@ -15191,6 +15191,64 @@
           </a:p>
         </p:txBody>
       </p:sp>
+      <p:sp>
+        <p:nvSpPr>
+          <p:cNvPr id="19" name="Rounded Rectangle 18"/>
+          <p:cNvSpPr/>
+          <p:nvPr/>
+        </p:nvSpPr>
+        <p:spPr>
+          <a:xfrm>
+            <a:off x="4427762" y="951680"/>
+            <a:ext cx="5596934" cy="1577028"/>
+          </a:xfrm>
+          <a:prstGeom prst="roundRect">
+            <a:avLst/>
+          </a:prstGeom>
+          <a:noFill/>
+          <a:ln w="57150">
+            <a:solidFill>
+              <a:srgbClr val="7030A0"/>
+            </a:solidFill>
+          </a:ln>
+        </p:spPr>
+        <p:style>
+          <a:lnRef idx="2">
+            <a:schemeClr val="accent1">
+              <a:shade val="50000"/>
+            </a:schemeClr>
+          </a:lnRef>
+          <a:fillRef idx="1">
+            <a:schemeClr val="accent1"/>
+          </a:fillRef>
+          <a:effectRef idx="0">
+            <a:schemeClr val="accent1"/>
+          </a:effectRef>
+          <a:fontRef idx="minor">
+            <a:schemeClr val="lt1"/>
+          </a:fontRef>
+        </p:style>
+        <p:txBody>
+          <a:bodyPr rtlCol="0" anchor="t" anchorCtr="0"/>
+          <a:lstStyle/>
+          <a:p>
+            <a:pPr algn="ctr"/>
+            <a:r>
+              <a:rPr lang="en-US" sz="2000" dirty="0" smtClean="0">
+                <a:solidFill>
+                  <a:srgbClr val="7030A0"/>
+                </a:solidFill>
+              </a:rPr>
+              <a:t>Score</a:t>
+            </a:r>
+            <a:endParaRPr lang="en-US" sz="2000" dirty="0">
+              <a:solidFill>
+                <a:srgbClr val="7030A0"/>
+              </a:solidFill>
+            </a:endParaRPr>
+          </a:p>
+        </p:txBody>
+      </p:sp>
     </p:spTree>
     <p:extLst>
       <p:ext uri="{BB962C8B-B14F-4D97-AF65-F5344CB8AC3E}">
@@ -15390,7 +15448,7 @@
                             </p:stCondLst>
                             <p:childTnLst>
                               <p:par>
-                                <p:cTn id="19" presetID="1" presetClass="entr" presetSubtype="0" fill="hold" nodeType="clickEffect">
+                                <p:cTn id="19" presetID="2" presetClass="entr" presetSubtype="8" fill="hold" grpId="0" nodeType="clickEffect">
                                   <p:stCondLst>
                                     <p:cond delay="0"/>
                                   </p:stCondLst>
@@ -15398,6 +15456,97 @@
                                     <p:set>
                                       <p:cBhvr>
                                         <p:cTn id="20" dur="1" fill="hold">
+                                          <p:stCondLst>
+                                            <p:cond delay="0"/>
+                                          </p:stCondLst>
+                                        </p:cTn>
+                                        <p:tgtEl>
+                                          <p:spTgt spid="19"/>
+                                        </p:tgtEl>
+                                        <p:attrNameLst>
+                                          <p:attrName>style.visibility</p:attrName>
+                                        </p:attrNameLst>
+                                      </p:cBhvr>
+                                      <p:to>
+                                        <p:strVal val="visible"/>
+                                      </p:to>
+                                    </p:set>
+                                    <p:anim calcmode="lin" valueType="num">
+                                      <p:cBhvr additive="base">
+                                        <p:cTn id="21" dur="500" fill="hold"/>
+                                        <p:tgtEl>
+                                          <p:spTgt spid="19"/>
+                                        </p:tgtEl>
+                                        <p:attrNameLst>
+                                          <p:attrName>ppt_x</p:attrName>
+                                        </p:attrNameLst>
+                                      </p:cBhvr>
+                                      <p:tavLst>
+                                        <p:tav tm="0">
+                                          <p:val>
+                                            <p:strVal val="0-#ppt_w/2"/>
+                                          </p:val>
+                                        </p:tav>
+                                        <p:tav tm="100000">
+                                          <p:val>
+                                            <p:strVal val="#ppt_x"/>
+                                          </p:val>
+                                        </p:tav>
+                                      </p:tavLst>
+                                    </p:anim>
+                                    <p:anim calcmode="lin" valueType="num">
+                                      <p:cBhvr additive="base">
+                                        <p:cTn id="22" dur="500" fill="hold"/>
+                                        <p:tgtEl>
+                                          <p:spTgt spid="19"/>
+                                        </p:tgtEl>
+                                        <p:attrNameLst>
+                                          <p:attrName>ppt_y</p:attrName>
+                                        </p:attrNameLst>
+                                      </p:cBhvr>
+                                      <p:tavLst>
+                                        <p:tav tm="0">
+                                          <p:val>
+                                            <p:strVal val="#ppt_y"/>
+                                          </p:val>
+                                        </p:tav>
+                                        <p:tav tm="100000">
+                                          <p:val>
+                                            <p:strVal val="#ppt_y"/>
+                                          </p:val>
+                                        </p:tav>
+                                      </p:tavLst>
+                                    </p:anim>
+                                  </p:childTnLst>
+                                </p:cTn>
+                              </p:par>
+                            </p:childTnLst>
+                          </p:cTn>
+                        </p:par>
+                      </p:childTnLst>
+                    </p:cTn>
+                  </p:par>
+                  <p:par>
+                    <p:cTn id="23" fill="hold">
+                      <p:stCondLst>
+                        <p:cond delay="indefinite"/>
+                      </p:stCondLst>
+                      <p:childTnLst>
+                        <p:par>
+                          <p:cTn id="24" fill="hold">
+                            <p:stCondLst>
+                              <p:cond delay="0"/>
+                            </p:stCondLst>
+                            <p:childTnLst>
+                              <p:par>
+                                <p:cTn id="25" presetID="1" presetClass="entr" presetSubtype="0" fill="hold" nodeType="clickEffect">
+                                  <p:stCondLst>
+                                    <p:cond delay="0"/>
+                                  </p:stCondLst>
+                                  <p:childTnLst>
+                                    <p:set>
+                                      <p:cBhvr>
+                                        <p:cTn id="26" dur="1" fill="hold">
                                           <p:stCondLst>
                                             <p:cond delay="0"/>
                                           </p:stCondLst>
@@ -15423,26 +15572,26 @@
                     </p:cTn>
                   </p:par>
                   <p:par>
-                    <p:cTn id="21" fill="hold">
+                    <p:cTn id="27" fill="hold">
                       <p:stCondLst>
                         <p:cond delay="indefinite"/>
                       </p:stCondLst>
                       <p:childTnLst>
                         <p:par>
-                          <p:cTn id="22" fill="hold">
+                          <p:cTn id="28" fill="hold">
                             <p:stCondLst>
                               <p:cond delay="0"/>
                             </p:stCondLst>
                             <p:childTnLst>
                               <p:par>
-                                <p:cTn id="23" presetID="1" presetClass="entr" presetSubtype="0" fill="hold" grpId="0" nodeType="clickEffect">
+                                <p:cTn id="29" presetID="1" presetClass="entr" presetSubtype="0" fill="hold" grpId="0" nodeType="clickEffect">
                                   <p:stCondLst>
                                     <p:cond delay="0"/>
                                   </p:stCondLst>
                                   <p:childTnLst>
                                     <p:set>
                                       <p:cBhvr>
-                                        <p:cTn id="24" dur="1" fill="hold">
+                                        <p:cTn id="30" dur="1" fill="hold">
                                           <p:stCondLst>
                                             <p:cond delay="0"/>
                                           </p:stCondLst>
@@ -15468,26 +15617,26 @@
                     </p:cTn>
                   </p:par>
                   <p:par>
-                    <p:cTn id="25" fill="hold">
+                    <p:cTn id="31" fill="hold">
                       <p:stCondLst>
                         <p:cond delay="indefinite"/>
                       </p:stCondLst>
                       <p:childTnLst>
                         <p:par>
-                          <p:cTn id="26" fill="hold">
+                          <p:cTn id="32" fill="hold">
                             <p:stCondLst>
                               <p:cond delay="0"/>
                             </p:stCondLst>
                             <p:childTnLst>
                               <p:par>
-                                <p:cTn id="27" presetID="1" presetClass="entr" presetSubtype="0" fill="hold" grpId="0" nodeType="clickEffect">
+                                <p:cTn id="33" presetID="1" presetClass="entr" presetSubtype="0" fill="hold" grpId="0" nodeType="clickEffect">
                                   <p:stCondLst>
                                     <p:cond delay="0"/>
                                   </p:stCondLst>
                                   <p:childTnLst>
                                     <p:set>
                                       <p:cBhvr>
-                                        <p:cTn id="28" dur="1" fill="hold">
+                                        <p:cTn id="34" dur="1" fill="hold">
                                           <p:stCondLst>
                                             <p:cond delay="0"/>
                                           </p:stCondLst>
@@ -15513,26 +15662,26 @@
                     </p:cTn>
                   </p:par>
                   <p:par>
-                    <p:cTn id="29" fill="hold">
+                    <p:cTn id="35" fill="hold">
                       <p:stCondLst>
                         <p:cond delay="indefinite"/>
                       </p:stCondLst>
                       <p:childTnLst>
                         <p:par>
-                          <p:cTn id="30" fill="hold">
+                          <p:cTn id="36" fill="hold">
                             <p:stCondLst>
                               <p:cond delay="0"/>
                             </p:stCondLst>
                             <p:childTnLst>
                               <p:par>
-                                <p:cTn id="31" presetID="1" presetClass="entr" presetSubtype="0" fill="hold" grpId="0" nodeType="clickEffect">
+                                <p:cTn id="37" presetID="1" presetClass="entr" presetSubtype="0" fill="hold" grpId="0" nodeType="clickEffect">
                                   <p:stCondLst>
                                     <p:cond delay="0"/>
                                   </p:stCondLst>
                                   <p:childTnLst>
                                     <p:set>
                                       <p:cBhvr>
-                                        <p:cTn id="32" dur="1" fill="hold">
+                                        <p:cTn id="38" dur="1" fill="hold">
                                           <p:stCondLst>
                                             <p:cond delay="0"/>
                                           </p:stCondLst>
@@ -15558,26 +15707,26 @@
                     </p:cTn>
                   </p:par>
                   <p:par>
-                    <p:cTn id="33" fill="hold">
+                    <p:cTn id="39" fill="hold">
                       <p:stCondLst>
                         <p:cond delay="indefinite"/>
                       </p:stCondLst>
                       <p:childTnLst>
                         <p:par>
-                          <p:cTn id="34" fill="hold">
+                          <p:cTn id="40" fill="hold">
                             <p:stCondLst>
                               <p:cond delay="0"/>
                             </p:stCondLst>
                             <p:childTnLst>
                               <p:par>
-                                <p:cTn id="35" presetID="1" presetClass="entr" presetSubtype="0" fill="hold" grpId="0" nodeType="clickEffect">
+                                <p:cTn id="41" presetID="1" presetClass="entr" presetSubtype="0" fill="hold" grpId="0" nodeType="clickEffect">
                                   <p:stCondLst>
                                     <p:cond delay="0"/>
                                   </p:stCondLst>
                                   <p:childTnLst>
                                     <p:set>
                                       <p:cBhvr>
-                                        <p:cTn id="36" dur="1" fill="hold">
+                                        <p:cTn id="42" dur="1" fill="hold">
                                           <p:stCondLst>
                                             <p:cond delay="0"/>
                                           </p:stCondLst>
@@ -15603,26 +15752,26 @@
                     </p:cTn>
                   </p:par>
                   <p:par>
-                    <p:cTn id="37" fill="hold">
+                    <p:cTn id="43" fill="hold">
                       <p:stCondLst>
                         <p:cond delay="indefinite"/>
                       </p:stCondLst>
                       <p:childTnLst>
                         <p:par>
-                          <p:cTn id="38" fill="hold">
+                          <p:cTn id="44" fill="hold">
                             <p:stCondLst>
                               <p:cond delay="0"/>
                             </p:stCondLst>
                             <p:childTnLst>
                               <p:par>
-                                <p:cTn id="39" presetID="2" presetClass="entr" presetSubtype="8" fill="hold" grpId="0" nodeType="clickEffect">
+                                <p:cTn id="45" presetID="2" presetClass="entr" presetSubtype="8" fill="hold" grpId="0" nodeType="clickEffect">
                                   <p:stCondLst>
                                     <p:cond delay="0"/>
                                   </p:stCondLst>
                                   <p:childTnLst>
                                     <p:set>
                                       <p:cBhvr>
-                                        <p:cTn id="40" dur="1" fill="hold">
+                                        <p:cTn id="46" dur="1" fill="hold">
                                           <p:stCondLst>
                                             <p:cond delay="0"/>
                                           </p:stCondLst>
@@ -15640,7 +15789,7 @@
                                     </p:set>
                                     <p:anim calcmode="lin" valueType="num">
                                       <p:cBhvr additive="base">
-                                        <p:cTn id="41" dur="500" fill="hold"/>
+                                        <p:cTn id="47" dur="500" fill="hold"/>
                                         <p:tgtEl>
                                           <p:spTgt spid="15"/>
                                         </p:tgtEl>
@@ -15663,7 +15812,7 @@
                                     </p:anim>
                                     <p:anim calcmode="lin" valueType="num">
                                       <p:cBhvr additive="base">
-                                        <p:cTn id="42" dur="500" fill="hold"/>
+                                        <p:cTn id="48" dur="500" fill="hold"/>
                                         <p:tgtEl>
                                           <p:spTgt spid="15"/>
                                         </p:tgtEl>
@@ -15694,26 +15843,26 @@
                     </p:cTn>
                   </p:par>
                   <p:par>
-                    <p:cTn id="43" fill="hold">
+                    <p:cTn id="49" fill="hold">
                       <p:stCondLst>
                         <p:cond delay="indefinite"/>
                       </p:stCondLst>
                       <p:childTnLst>
                         <p:par>
-                          <p:cTn id="44" fill="hold">
+                          <p:cTn id="50" fill="hold">
                             <p:stCondLst>
                               <p:cond delay="0"/>
                             </p:stCondLst>
                             <p:childTnLst>
                               <p:par>
-                                <p:cTn id="45" presetID="1" presetClass="exit" presetSubtype="0" fill="hold" grpId="0" nodeType="clickEffect">
+                                <p:cTn id="51" presetID="1" presetClass="exit" presetSubtype="0" fill="hold" grpId="0" nodeType="clickEffect">
                                   <p:stCondLst>
                                     <p:cond delay="0"/>
                                   </p:stCondLst>
                                   <p:childTnLst>
                                     <p:set>
                                       <p:cBhvr>
-                                        <p:cTn id="46" dur="1" fill="hold">
+                                        <p:cTn id="52" dur="1" fill="hold">
                                           <p:stCondLst>
                                             <p:cond delay="0"/>
                                           </p:stCondLst>
@@ -15769,6 +15918,7 @@
       <p:bldP spid="15" grpId="0" animBg="1"/>
       <p:bldP spid="17" grpId="0" animBg="1"/>
       <p:bldP spid="18" grpId="0" animBg="1"/>
+      <p:bldP spid="19" grpId="0" animBg="1"/>
     </p:bldLst>
   </p:timing>
 </p:sld>
@@ -15926,6 +16076,13 @@
   <p:transition>
     <p:fade/>
   </p:transition>
+  <p:timing>
+    <p:tnLst>
+      <p:par>
+        <p:cTn id="1" dur="indefinite" restart="never" nodeType="tmRoot"/>
+      </p:par>
+    </p:tnLst>
+  </p:timing>
 </p:sld>
 </file>
 
@@ -15998,12 +16155,8 @@
           <a:p>
             <a:pPr lvl="1"/>
             <a:r>
-              <a:rPr lang="en-US" sz="2000" dirty="0" err="1" smtClean="0"/>
-              <a:t>Baysian</a:t>
-            </a:r>
-            <a:r>
               <a:rPr lang="en-US" sz="2000" dirty="0" smtClean="0"/>
-              <a:t> </a:t>
+              <a:t>Bayesian </a:t>
             </a:r>
             <a:r>
               <a:rPr lang="en-US" sz="2000" dirty="0"/>
@@ -16051,8 +16204,8 @@
               <a:t>Fast </a:t>
             </a:r>
             <a:r>
-              <a:rPr lang="en-US" sz="2000" dirty="0"/>
-              <a:t>Forrest </a:t>
+              <a:rPr lang="en-US" sz="2000" dirty="0" smtClean="0"/>
+              <a:t>Forest </a:t>
             </a:r>
             <a:r>
               <a:rPr lang="en-US" sz="2000" dirty="0" err="1"/>
@@ -16378,6 +16531,13 @@
   <p:transition>
     <p:fade/>
   </p:transition>
+  <p:timing>
+    <p:tnLst>
+      <p:par>
+        <p:cTn id="1" dur="indefinite" restart="never" nodeType="tmRoot"/>
+      </p:par>
+    </p:tnLst>
+  </p:timing>
 </p:sld>
 </file>
 
@@ -16415,7 +16575,11 @@
           <a:p>
             <a:r>
               <a:rPr lang="en-US" dirty="0" smtClean="0"/>
-              <a:t>Samples of Algorithms Available</a:t>
+              <a:t>Modules and Analysis </a:t>
+            </a:r>
+            <a:r>
+              <a:rPr lang="en-US" dirty="0" err="1" smtClean="0"/>
+              <a:t>Availible</a:t>
             </a:r>
             <a:endParaRPr lang="en-US" dirty="0"/>
           </a:p>

</xml_diff>